<commit_message>
Test page Logout ->ok
</commit_message>
<xml_diff>
--- a/Projet Argent Bank.pptx
+++ b/Projet Argent Bank.pptx
@@ -12588,8 +12588,8 @@
         </p:nvSpPr>
         <p:spPr bwMode="auto">
           <a:xfrm>
-            <a:off x="86330" y="3395886"/>
-            <a:ext cx="11959186" cy="3323987"/>
+            <a:off x="378042" y="2366290"/>
+            <a:ext cx="11435916" cy="4431983"/>
           </a:xfrm>
           <a:prstGeom prst="rect">
             <a:avLst/>
@@ -12808,6 +12808,34 @@
               <a:buClrTx/>
               <a:buSzTx/>
               <a:buFontTx/>
+              <a:buNone/>
+              <a:tabLst/>
+            </a:pPr>
+            <a:endParaRPr kumimoji="0" lang="fr-FR" altLang="fr-FR" b="0" i="0" u="none" strike="noStrike" cap="none" normalizeH="0" baseline="0" dirty="0">
+              <a:ln>
+                <a:noFill/>
+              </a:ln>
+              <a:solidFill>
+                <a:schemeClr val="tx1"/>
+              </a:solidFill>
+              <a:effectLst/>
+              <a:latin typeface="fkGrotesk"/>
+            </a:endParaRPr>
+          </a:p>
+          <a:p>
+            <a:pPr marL="0" marR="0" lvl="0" indent="0" algn="l" defTabSz="914400" rtl="0" eaLnBrk="0" fontAlgn="base" latinLnBrk="0" hangingPunct="0">
+              <a:lnSpc>
+                <a:spcPct val="100000"/>
+              </a:lnSpc>
+              <a:spcBef>
+                <a:spcPct val="0"/>
+              </a:spcBef>
+              <a:spcAft>
+                <a:spcPct val="0"/>
+              </a:spcAft>
+              <a:buClrTx/>
+              <a:buSzTx/>
+              <a:buFontTx/>
               <a:buAutoNum type="arabicPeriod"/>
               <a:tabLst/>
             </a:pPr>
@@ -12940,6 +12968,34 @@
             </a:r>
           </a:p>
           <a:p>
+            <a:pPr marL="457200" marR="0" lvl="1" indent="0" algn="l" defTabSz="914400" rtl="0" eaLnBrk="0" fontAlgn="base" latinLnBrk="0" hangingPunct="0">
+              <a:lnSpc>
+                <a:spcPct val="100000"/>
+              </a:lnSpc>
+              <a:spcBef>
+                <a:spcPct val="0"/>
+              </a:spcBef>
+              <a:spcAft>
+                <a:spcPct val="0"/>
+              </a:spcAft>
+              <a:buClrTx/>
+              <a:buSzTx/>
+              <a:buFontTx/>
+              <a:buChar char="•"/>
+              <a:tabLst/>
+            </a:pPr>
+            <a:endParaRPr kumimoji="0" lang="fr-FR" altLang="fr-FR" b="0" i="0" u="none" strike="noStrike" cap="none" normalizeH="0" baseline="0" dirty="0">
+              <a:ln>
+                <a:noFill/>
+              </a:ln>
+              <a:solidFill>
+                <a:schemeClr val="tx1"/>
+              </a:solidFill>
+              <a:effectLst/>
+              <a:latin typeface="fkGroteskNeue"/>
+            </a:endParaRPr>
+          </a:p>
+          <a:p>
             <a:pPr marL="0" marR="0" lvl="0" indent="0" algn="l" defTabSz="914400" rtl="0" eaLnBrk="0" fontAlgn="base" latinLnBrk="0" hangingPunct="0">
               <a:lnSpc>
                 <a:spcPct val="100000"/>
@@ -13041,6 +13097,34 @@
             </a:r>
           </a:p>
           <a:p>
+            <a:pPr marL="457200" marR="0" lvl="1" indent="0" algn="l" defTabSz="914400" rtl="0" eaLnBrk="0" fontAlgn="base" latinLnBrk="0" hangingPunct="0">
+              <a:lnSpc>
+                <a:spcPct val="100000"/>
+              </a:lnSpc>
+              <a:spcBef>
+                <a:spcPct val="0"/>
+              </a:spcBef>
+              <a:spcAft>
+                <a:spcPct val="0"/>
+              </a:spcAft>
+              <a:buClrTx/>
+              <a:buSzTx/>
+              <a:buFontTx/>
+              <a:buChar char="•"/>
+              <a:tabLst/>
+            </a:pPr>
+            <a:endParaRPr kumimoji="0" lang="fr-FR" altLang="fr-FR" b="0" i="0" u="none" strike="noStrike" cap="none" normalizeH="0" baseline="0" dirty="0">
+              <a:ln>
+                <a:noFill/>
+              </a:ln>
+              <a:solidFill>
+                <a:schemeClr val="tx1"/>
+              </a:solidFill>
+              <a:effectLst/>
+              <a:latin typeface="fkGroteskNeue"/>
+            </a:endParaRPr>
+          </a:p>
+          <a:p>
             <a:pPr marL="0" marR="0" lvl="0" indent="0" algn="l" defTabSz="914400" rtl="0" eaLnBrk="0" fontAlgn="base" latinLnBrk="0" hangingPunct="0">
               <a:lnSpc>
                 <a:spcPct val="100000"/>
@@ -13236,6 +13320,34 @@
               </a:rPr>
               <a:t>À désactiver en production pour des raisons de performance et de sécurité.</a:t>
             </a:r>
+          </a:p>
+          <a:p>
+            <a:pPr marL="457200" marR="0" lvl="1" indent="0" algn="l" defTabSz="914400" rtl="0" eaLnBrk="0" fontAlgn="base" latinLnBrk="0" hangingPunct="0">
+              <a:lnSpc>
+                <a:spcPct val="100000"/>
+              </a:lnSpc>
+              <a:spcBef>
+                <a:spcPct val="0"/>
+              </a:spcBef>
+              <a:spcAft>
+                <a:spcPct val="0"/>
+              </a:spcAft>
+              <a:buClrTx/>
+              <a:buSzTx/>
+              <a:buFontTx/>
+              <a:buChar char="•"/>
+              <a:tabLst/>
+            </a:pPr>
+            <a:endParaRPr kumimoji="0" lang="fr-FR" altLang="fr-FR" b="0" i="0" u="none" strike="noStrike" cap="none" normalizeH="0" baseline="0" dirty="0">
+              <a:ln>
+                <a:noFill/>
+              </a:ln>
+              <a:solidFill>
+                <a:schemeClr val="tx1"/>
+              </a:solidFill>
+              <a:effectLst/>
+              <a:latin typeface="fkGroteskNeue"/>
+            </a:endParaRPr>
           </a:p>
           <a:p>
             <a:pPr marL="0" marR="0" lvl="0" indent="0" algn="l" defTabSz="914400" rtl="0" eaLnBrk="0" fontAlgn="base" latinLnBrk="0" hangingPunct="0">
@@ -13364,8 +13476,8 @@
         </p:blipFill>
         <p:spPr>
           <a:xfrm>
-            <a:off x="6827520" y="59727"/>
-            <a:ext cx="5217996" cy="3369273"/>
+            <a:off x="8056880" y="59727"/>
+            <a:ext cx="3988636" cy="3729953"/>
           </a:xfrm>
           <a:prstGeom prst="rect">
             <a:avLst/>

</xml_diff>